<commit_message>
Added measure theory tex
</commit_message>
<xml_diff>
--- a/Talks/Pics/TensorFlow_UserGroups_SpeakerBannerTemplate_rajat.pptx
+++ b/Talks/Pics/TensorFlow_UserGroups_SpeakerBannerTemplate_rajat.pptx
@@ -2855,10 +2855,22 @@
                 <a:cs typeface="Google Sans Medium"/>
                 <a:sym typeface="Google Sans"/>
               </a:rPr>
-              <a:t>9 to 10 am IST, 17</a:t>
+              <a:t>9 to 10 am IST</a:t>
             </a:r>
             <a:r>
-              <a:rPr lang="en-IN" sz="1600" baseline="30000" dirty="0">
+              <a:rPr lang="en-IN" sz="1600">
+                <a:solidFill>
+                  <a:srgbClr val="425066"/>
+                </a:solidFill>
+                <a:latin typeface="Google Sans"/>
+                <a:ea typeface="Google Sans Medium"/>
+                <a:cs typeface="Google Sans Medium"/>
+                <a:sym typeface="Google Sans"/>
+              </a:rPr>
+              <a:t>, 18</a:t>
+            </a:r>
+            <a:r>
+              <a:rPr lang="en-IN" sz="1600" baseline="30000">
                 <a:solidFill>
                   <a:srgbClr val="425066"/>
                 </a:solidFill>
@@ -2870,6 +2882,18 @@
               <a:t>th</a:t>
             </a:r>
             <a:r>
+              <a:rPr lang="en-IN" sz="1600">
+                <a:solidFill>
+                  <a:srgbClr val="425066"/>
+                </a:solidFill>
+                <a:latin typeface="Google Sans"/>
+                <a:ea typeface="Google Sans Medium"/>
+                <a:cs typeface="Google Sans Medium"/>
+                <a:sym typeface="Google Sans"/>
+              </a:rPr>
+              <a:t> </a:t>
+            </a:r>
+            <a:r>
               <a:rPr lang="en-IN" sz="1600" dirty="0">
                 <a:solidFill>
                   <a:srgbClr val="425066"/>
@@ -2879,7 +2903,7 @@
                 <a:cs typeface="Google Sans Medium"/>
                 <a:sym typeface="Google Sans"/>
               </a:rPr>
-              <a:t> September, 2021</a:t>
+              <a:t>September, 2021</a:t>
             </a:r>
           </a:p>
           <a:p>

</xml_diff>